<commit_message>
new plots of resuduals + update OmegaM_w + creation of ppt 'Récapitulatif chi2,HD,résidus'
</commit_message>
<xml_diff>
--- a/2-modèle G modifié/calibration/2_Modèle uniquement/« Modèle uniquement » Etudes influences coefficients.pptx
+++ b/2-modèle G modifié/calibration/2_Modèle uniquement/« Modèle uniquement » Etudes influences coefficients.pptx
@@ -20,6 +20,16 @@
     <p:sldId id="265" r:id="rId14"/>
     <p:sldId id="266" r:id="rId15"/>
     <p:sldId id="267" r:id="rId16"/>
+    <p:sldId id="272" r:id="rId17"/>
+    <p:sldId id="273" r:id="rId18"/>
+    <p:sldId id="275" r:id="rId19"/>
+    <p:sldId id="274" r:id="rId20"/>
+    <p:sldId id="276" r:id="rId21"/>
+    <p:sldId id="277" r:id="rId22"/>
+    <p:sldId id="278" r:id="rId23"/>
+    <p:sldId id="279" r:id="rId24"/>
+    <p:sldId id="280" r:id="rId25"/>
+    <p:sldId id="281" r:id="rId26"/>
   </p:sldIdLst>
   <p:sldSz cx="12192000" cy="6858000"/>
   <p:notesSz cx="6858000" cy="9144000"/>
@@ -118,6 +128,11 @@
       </a:defRPr>
     </a:lvl9pPr>
   </p:defaultTextStyle>
+  <p:extLst>
+    <p:ext uri="{EFAFB233-063F-42B5-8137-9DF3F51BA10A}">
+      <p15:sldGuideLst xmlns:p15="http://schemas.microsoft.com/office/powerpoint/2012/main"/>
+    </p:ext>
+  </p:extLst>
 </p:presentation>
 </file>
 
@@ -252,7 +267,7 @@
           <a:p>
             <a:fld id="{6942A6B8-658C-418C-B8FA-208343183816}" type="datetimeFigureOut">
               <a:rPr lang="fr-FR" smtClean="0"/>
-              <a:t>20/12/2023</a:t>
+              <a:t>11/01/2024</a:t>
             </a:fld>
             <a:endParaRPr lang="fr-FR"/>
           </a:p>
@@ -422,7 +437,7 @@
           <a:p>
             <a:fld id="{6942A6B8-658C-418C-B8FA-208343183816}" type="datetimeFigureOut">
               <a:rPr lang="fr-FR" smtClean="0"/>
-              <a:t>20/12/2023</a:t>
+              <a:t>11/01/2024</a:t>
             </a:fld>
             <a:endParaRPr lang="fr-FR"/>
           </a:p>
@@ -602,7 +617,7 @@
           <a:p>
             <a:fld id="{6942A6B8-658C-418C-B8FA-208343183816}" type="datetimeFigureOut">
               <a:rPr lang="fr-FR" smtClean="0"/>
-              <a:t>20/12/2023</a:t>
+              <a:t>11/01/2024</a:t>
             </a:fld>
             <a:endParaRPr lang="fr-FR"/>
           </a:p>
@@ -772,7 +787,7 @@
           <a:p>
             <a:fld id="{6942A6B8-658C-418C-B8FA-208343183816}" type="datetimeFigureOut">
               <a:rPr lang="fr-FR" smtClean="0"/>
-              <a:t>20/12/2023</a:t>
+              <a:t>11/01/2024</a:t>
             </a:fld>
             <a:endParaRPr lang="fr-FR"/>
           </a:p>
@@ -1018,7 +1033,7 @@
           <a:p>
             <a:fld id="{6942A6B8-658C-418C-B8FA-208343183816}" type="datetimeFigureOut">
               <a:rPr lang="fr-FR" smtClean="0"/>
-              <a:t>20/12/2023</a:t>
+              <a:t>11/01/2024</a:t>
             </a:fld>
             <a:endParaRPr lang="fr-FR"/>
           </a:p>
@@ -1250,7 +1265,7 @@
           <a:p>
             <a:fld id="{6942A6B8-658C-418C-B8FA-208343183816}" type="datetimeFigureOut">
               <a:rPr lang="fr-FR" smtClean="0"/>
-              <a:t>20/12/2023</a:t>
+              <a:t>11/01/2024</a:t>
             </a:fld>
             <a:endParaRPr lang="fr-FR"/>
           </a:p>
@@ -1617,7 +1632,7 @@
           <a:p>
             <a:fld id="{6942A6B8-658C-418C-B8FA-208343183816}" type="datetimeFigureOut">
               <a:rPr lang="fr-FR" smtClean="0"/>
-              <a:t>20/12/2023</a:t>
+              <a:t>11/01/2024</a:t>
             </a:fld>
             <a:endParaRPr lang="fr-FR"/>
           </a:p>
@@ -1735,7 +1750,7 @@
           <a:p>
             <a:fld id="{6942A6B8-658C-418C-B8FA-208343183816}" type="datetimeFigureOut">
               <a:rPr lang="fr-FR" smtClean="0"/>
-              <a:t>20/12/2023</a:t>
+              <a:t>11/01/2024</a:t>
             </a:fld>
             <a:endParaRPr lang="fr-FR"/>
           </a:p>
@@ -1830,7 +1845,7 @@
           <a:p>
             <a:fld id="{6942A6B8-658C-418C-B8FA-208343183816}" type="datetimeFigureOut">
               <a:rPr lang="fr-FR" smtClean="0"/>
-              <a:t>20/12/2023</a:t>
+              <a:t>11/01/2024</a:t>
             </a:fld>
             <a:endParaRPr lang="fr-FR"/>
           </a:p>
@@ -2107,7 +2122,7 @@
           <a:p>
             <a:fld id="{6942A6B8-658C-418C-B8FA-208343183816}" type="datetimeFigureOut">
               <a:rPr lang="fr-FR" smtClean="0"/>
-              <a:t>20/12/2023</a:t>
+              <a:t>11/01/2024</a:t>
             </a:fld>
             <a:endParaRPr lang="fr-FR"/>
           </a:p>
@@ -2364,7 +2379,7 @@
           <a:p>
             <a:fld id="{6942A6B8-658C-418C-B8FA-208343183816}" type="datetimeFigureOut">
               <a:rPr lang="fr-FR" smtClean="0"/>
-              <a:t>20/12/2023</a:t>
+              <a:t>11/01/2024</a:t>
             </a:fld>
             <a:endParaRPr lang="fr-FR"/>
           </a:p>
@@ -2577,7 +2592,7 @@
           <a:p>
             <a:fld id="{6942A6B8-658C-418C-B8FA-208343183816}" type="datetimeFigureOut">
               <a:rPr lang="fr-FR" smtClean="0"/>
-              <a:t>20/12/2023</a:t>
+              <a:t>11/01/2024</a:t>
             </a:fld>
             <a:endParaRPr lang="fr-FR"/>
           </a:p>
@@ -3885,6 +3900,478 @@
 </p:sld>
 </file>
 
+<file path=ppt/slides/slide16.xml><?xml version="1.0" encoding="utf-8"?>
+<p:sld xmlns:a="http://schemas.openxmlformats.org/drawingml/2006/main" xmlns:r="http://schemas.openxmlformats.org/officeDocument/2006/relationships" xmlns:p="http://schemas.openxmlformats.org/presentationml/2006/main">
+  <p:cSld>
+    <p:spTree>
+      <p:nvGrpSpPr>
+        <p:cNvPr id="1" name=""/>
+        <p:cNvGrpSpPr/>
+        <p:nvPr/>
+      </p:nvGrpSpPr>
+      <p:grpSpPr>
+        <a:xfrm>
+          <a:off x="0" y="0"/>
+          <a:ext cx="0" cy="0"/>
+          <a:chOff x="0" y="0"/>
+          <a:chExt cx="0" cy="0"/>
+        </a:xfrm>
+      </p:grpSpPr>
+      <p:sp>
+        <p:nvSpPr>
+          <p:cNvPr id="2" name="Titre 1">
+            <a:extLst>
+              <a:ext uri="{FF2B5EF4-FFF2-40B4-BE49-F238E27FC236}">
+                <a16:creationId xmlns:a16="http://schemas.microsoft.com/office/drawing/2014/main" id="{EFFE9BB0-B7E2-AD02-D4F7-0FB2A0A33508}"/>
+              </a:ext>
+            </a:extLst>
+          </p:cNvPr>
+          <p:cNvSpPr>
+            <a:spLocks noGrp="1"/>
+          </p:cNvSpPr>
+          <p:nvPr>
+            <p:ph type="ctrTitle"/>
+          </p:nvPr>
+        </p:nvSpPr>
+        <p:spPr/>
+        <p:txBody>
+          <a:bodyPr>
+            <a:normAutofit/>
+          </a:bodyPr>
+          <a:lstStyle/>
+          <a:p>
+            <a:r>
+              <a:rPr lang="fr-FR" dirty="0"/>
+              <a:t>alpha fixé (on essaie de voir l’influence de alpha)</a:t>
+            </a:r>
+          </a:p>
+        </p:txBody>
+      </p:sp>
+      <p:sp>
+        <p:nvSpPr>
+          <p:cNvPr id="3" name="Sous-titre 2">
+            <a:extLst>
+              <a:ext uri="{FF2B5EF4-FFF2-40B4-BE49-F238E27FC236}">
+                <a16:creationId xmlns:a16="http://schemas.microsoft.com/office/drawing/2014/main" id="{7491D719-04DB-07B0-CC74-848484102C00}"/>
+              </a:ext>
+            </a:extLst>
+          </p:cNvPr>
+          <p:cNvSpPr>
+            <a:spLocks noGrp="1"/>
+          </p:cNvSpPr>
+          <p:nvPr>
+            <p:ph type="subTitle" idx="1"/>
+          </p:nvPr>
+        </p:nvSpPr>
+        <p:spPr/>
+        <p:txBody>
+          <a:bodyPr/>
+          <a:lstStyle/>
+          <a:p>
+            <a:endParaRPr lang="fr-FR"/>
+          </a:p>
+        </p:txBody>
+      </p:sp>
+    </p:spTree>
+    <p:extLst>
+      <p:ext uri="{BB962C8B-B14F-4D97-AF65-F5344CB8AC3E}">
+        <p14:creationId xmlns:p14="http://schemas.microsoft.com/office/powerpoint/2010/main" val="1351923015"/>
+      </p:ext>
+    </p:extLst>
+  </p:cSld>
+  <p:clrMapOvr>
+    <a:masterClrMapping/>
+  </p:clrMapOvr>
+</p:sld>
+</file>
+
+<file path=ppt/slides/slide17.xml><?xml version="1.0" encoding="utf-8"?>
+<p:sld xmlns:a="http://schemas.openxmlformats.org/drawingml/2006/main" xmlns:r="http://schemas.openxmlformats.org/officeDocument/2006/relationships" xmlns:p="http://schemas.openxmlformats.org/presentationml/2006/main">
+  <p:cSld>
+    <p:spTree>
+      <p:nvGrpSpPr>
+        <p:cNvPr id="1" name=""/>
+        <p:cNvGrpSpPr/>
+        <p:nvPr/>
+      </p:nvGrpSpPr>
+      <p:grpSpPr>
+        <a:xfrm>
+          <a:off x="0" y="0"/>
+          <a:ext cx="0" cy="0"/>
+          <a:chOff x="0" y="0"/>
+          <a:chExt cx="0" cy="0"/>
+        </a:xfrm>
+      </p:grpSpPr>
+      <p:sp>
+        <p:nvSpPr>
+          <p:cNvPr id="2" name="Titre 1">
+            <a:extLst>
+              <a:ext uri="{FF2B5EF4-FFF2-40B4-BE49-F238E27FC236}">
+                <a16:creationId xmlns:a16="http://schemas.microsoft.com/office/drawing/2014/main" id="{6402971F-1266-ED9D-0A6C-B7D00AA538EA}"/>
+              </a:ext>
+            </a:extLst>
+          </p:cNvPr>
+          <p:cNvSpPr>
+            <a:spLocks noGrp="1"/>
+          </p:cNvSpPr>
+          <p:nvPr>
+            <p:ph type="title"/>
+          </p:nvPr>
+        </p:nvSpPr>
+        <p:spPr>
+          <a:xfrm>
+            <a:off x="1269506" y="17316"/>
+            <a:ext cx="10515600" cy="1325563"/>
+          </a:xfrm>
+        </p:spPr>
+        <p:txBody>
+          <a:bodyPr/>
+          <a:lstStyle/>
+          <a:p>
+            <a:r>
+              <a:rPr lang="fr-FR" dirty="0"/>
+              <a:t>Alpha = 0,18 (à peu près valeur voulue)</a:t>
+            </a:r>
+          </a:p>
+        </p:txBody>
+      </p:sp>
+      <p:pic>
+        <p:nvPicPr>
+          <p:cNvPr id="5" name="Image 4">
+            <a:extLst>
+              <a:ext uri="{FF2B5EF4-FFF2-40B4-BE49-F238E27FC236}">
+                <a16:creationId xmlns:a16="http://schemas.microsoft.com/office/drawing/2014/main" id="{373FBF4E-D4E7-E337-5F83-765C08C1A4FF}"/>
+              </a:ext>
+            </a:extLst>
+          </p:cNvPr>
+          <p:cNvPicPr>
+            <a:picLocks noChangeAspect="1"/>
+          </p:cNvPicPr>
+          <p:nvPr/>
+        </p:nvPicPr>
+        <p:blipFill>
+          <a:blip r:embed="rId2"/>
+          <a:stretch>
+            <a:fillRect/>
+          </a:stretch>
+        </p:blipFill>
+        <p:spPr>
+          <a:xfrm>
+            <a:off x="1269506" y="1393913"/>
+            <a:ext cx="8984202" cy="4783989"/>
+          </a:xfrm>
+          <a:prstGeom prst="rect">
+            <a:avLst/>
+          </a:prstGeom>
+        </p:spPr>
+      </p:pic>
+      <p:sp>
+        <p:nvSpPr>
+          <p:cNvPr id="6" name="ZoneTexte 5">
+            <a:extLst>
+              <a:ext uri="{FF2B5EF4-FFF2-40B4-BE49-F238E27FC236}">
+                <a16:creationId xmlns:a16="http://schemas.microsoft.com/office/drawing/2014/main" id="{654D280B-FB7D-5A17-089D-998A694EB372}"/>
+              </a:ext>
+            </a:extLst>
+          </p:cNvPr>
+          <p:cNvSpPr txBox="1"/>
+          <p:nvPr/>
+        </p:nvSpPr>
+        <p:spPr>
+          <a:xfrm>
+            <a:off x="10591060" y="1589103"/>
+            <a:ext cx="1269507" cy="646331"/>
+          </a:xfrm>
+          <a:prstGeom prst="rect">
+            <a:avLst/>
+          </a:prstGeom>
+          <a:noFill/>
+        </p:spPr>
+        <p:txBody>
+          <a:bodyPr wrap="square" rtlCol="0">
+            <a:spAutoFit/>
+          </a:bodyPr>
+          <a:lstStyle/>
+          <a:p>
+            <a:r>
+              <a:rPr lang="fr-FR" dirty="0"/>
+              <a:t>Min chi2 = 3789.44</a:t>
+            </a:r>
+          </a:p>
+        </p:txBody>
+      </p:sp>
+    </p:spTree>
+    <p:extLst>
+      <p:ext uri="{BB962C8B-B14F-4D97-AF65-F5344CB8AC3E}">
+        <p14:creationId xmlns:p14="http://schemas.microsoft.com/office/powerpoint/2010/main" val="2778044731"/>
+      </p:ext>
+    </p:extLst>
+  </p:cSld>
+  <p:clrMapOvr>
+    <a:masterClrMapping/>
+  </p:clrMapOvr>
+</p:sld>
+</file>
+
+<file path=ppt/slides/slide18.xml><?xml version="1.0" encoding="utf-8"?>
+<p:sld xmlns:a="http://schemas.openxmlformats.org/drawingml/2006/main" xmlns:r="http://schemas.openxmlformats.org/officeDocument/2006/relationships" xmlns:p="http://schemas.openxmlformats.org/presentationml/2006/main">
+  <p:cSld>
+    <p:spTree>
+      <p:nvGrpSpPr>
+        <p:cNvPr id="1" name=""/>
+        <p:cNvGrpSpPr/>
+        <p:nvPr/>
+      </p:nvGrpSpPr>
+      <p:grpSpPr>
+        <a:xfrm>
+          <a:off x="0" y="0"/>
+          <a:ext cx="0" cy="0"/>
+          <a:chOff x="0" y="0"/>
+          <a:chExt cx="0" cy="0"/>
+        </a:xfrm>
+      </p:grpSpPr>
+      <p:sp>
+        <p:nvSpPr>
+          <p:cNvPr id="2" name="Titre 1">
+            <a:extLst>
+              <a:ext uri="{FF2B5EF4-FFF2-40B4-BE49-F238E27FC236}">
+                <a16:creationId xmlns:a16="http://schemas.microsoft.com/office/drawing/2014/main" id="{4A853772-7A18-33BE-75C5-50A84E49E2DE}"/>
+              </a:ext>
+            </a:extLst>
+          </p:cNvPr>
+          <p:cNvSpPr>
+            <a:spLocks noGrp="1"/>
+          </p:cNvSpPr>
+          <p:nvPr>
+            <p:ph type="title"/>
+          </p:nvPr>
+        </p:nvSpPr>
+        <p:spPr/>
+        <p:txBody>
+          <a:bodyPr/>
+          <a:lstStyle/>
+          <a:p>
+            <a:endParaRPr lang="fr-FR"/>
+          </a:p>
+        </p:txBody>
+      </p:sp>
+      <p:sp>
+        <p:nvSpPr>
+          <p:cNvPr id="3" name="Espace réservé du contenu 2">
+            <a:extLst>
+              <a:ext uri="{FF2B5EF4-FFF2-40B4-BE49-F238E27FC236}">
+                <a16:creationId xmlns:a16="http://schemas.microsoft.com/office/drawing/2014/main" id="{DE345D36-0C00-7582-0411-1164341D09B4}"/>
+              </a:ext>
+            </a:extLst>
+          </p:cNvPr>
+          <p:cNvSpPr>
+            <a:spLocks noGrp="1"/>
+          </p:cNvSpPr>
+          <p:nvPr>
+            <p:ph idx="1"/>
+          </p:nvPr>
+        </p:nvSpPr>
+        <p:spPr/>
+        <p:txBody>
+          <a:bodyPr/>
+          <a:lstStyle/>
+          <a:p>
+            <a:endParaRPr lang="fr-FR"/>
+          </a:p>
+        </p:txBody>
+      </p:sp>
+      <p:pic>
+        <p:nvPicPr>
+          <p:cNvPr id="5" name="Image 4">
+            <a:extLst>
+              <a:ext uri="{FF2B5EF4-FFF2-40B4-BE49-F238E27FC236}">
+                <a16:creationId xmlns:a16="http://schemas.microsoft.com/office/drawing/2014/main" id="{216E85F0-DF7E-22C2-FF74-B613D9AF7540}"/>
+              </a:ext>
+            </a:extLst>
+          </p:cNvPr>
+          <p:cNvPicPr>
+            <a:picLocks noChangeAspect="1"/>
+          </p:cNvPicPr>
+          <p:nvPr/>
+        </p:nvPicPr>
+        <p:blipFill>
+          <a:blip r:embed="rId2"/>
+          <a:stretch>
+            <a:fillRect/>
+          </a:stretch>
+        </p:blipFill>
+        <p:spPr>
+          <a:xfrm>
+            <a:off x="973084" y="754603"/>
+            <a:ext cx="10245831" cy="5550922"/>
+          </a:xfrm>
+          <a:prstGeom prst="rect">
+            <a:avLst/>
+          </a:prstGeom>
+        </p:spPr>
+      </p:pic>
+    </p:spTree>
+    <p:extLst>
+      <p:ext uri="{BB962C8B-B14F-4D97-AF65-F5344CB8AC3E}">
+        <p14:creationId xmlns:p14="http://schemas.microsoft.com/office/powerpoint/2010/main" val="187720356"/>
+      </p:ext>
+    </p:extLst>
+  </p:cSld>
+  <p:clrMapOvr>
+    <a:masterClrMapping/>
+  </p:clrMapOvr>
+</p:sld>
+</file>
+
+<file path=ppt/slides/slide19.xml><?xml version="1.0" encoding="utf-8"?>
+<p:sld xmlns:a="http://schemas.openxmlformats.org/drawingml/2006/main" xmlns:r="http://schemas.openxmlformats.org/officeDocument/2006/relationships" xmlns:p="http://schemas.openxmlformats.org/presentationml/2006/main">
+  <p:cSld>
+    <p:spTree>
+      <p:nvGrpSpPr>
+        <p:cNvPr id="1" name=""/>
+        <p:cNvGrpSpPr/>
+        <p:nvPr/>
+      </p:nvGrpSpPr>
+      <p:grpSpPr>
+        <a:xfrm>
+          <a:off x="0" y="0"/>
+          <a:ext cx="0" cy="0"/>
+          <a:chOff x="0" y="0"/>
+          <a:chExt cx="0" cy="0"/>
+        </a:xfrm>
+      </p:grpSpPr>
+      <p:sp>
+        <p:nvSpPr>
+          <p:cNvPr id="4" name="Titre 1">
+            <a:extLst>
+              <a:ext uri="{FF2B5EF4-FFF2-40B4-BE49-F238E27FC236}">
+                <a16:creationId xmlns:a16="http://schemas.microsoft.com/office/drawing/2014/main" id="{29E8814F-DD27-19F8-B716-C61E47DA96EE}"/>
+              </a:ext>
+            </a:extLst>
+          </p:cNvPr>
+          <p:cNvSpPr txBox="1">
+            <a:spLocks/>
+          </p:cNvSpPr>
+          <p:nvPr/>
+        </p:nvSpPr>
+        <p:spPr>
+          <a:xfrm>
+            <a:off x="910701" y="0"/>
+            <a:ext cx="10515600" cy="1325563"/>
+          </a:xfrm>
+          <a:prstGeom prst="rect">
+            <a:avLst/>
+          </a:prstGeom>
+        </p:spPr>
+        <p:txBody>
+          <a:bodyPr vert="horz" lIns="91440" tIns="45720" rIns="91440" bIns="45720" rtlCol="0" anchor="ctr">
+            <a:normAutofit/>
+          </a:bodyPr>
+          <a:lstStyle>
+            <a:lvl1pPr algn="l" defTabSz="914400" rtl="0" eaLnBrk="1" latinLnBrk="0" hangingPunct="1">
+              <a:lnSpc>
+                <a:spcPct val="90000"/>
+              </a:lnSpc>
+              <a:spcBef>
+                <a:spcPct val="0"/>
+              </a:spcBef>
+              <a:buNone/>
+              <a:defRPr sz="4400" kern="1200">
+                <a:solidFill>
+                  <a:schemeClr val="tx1"/>
+                </a:solidFill>
+                <a:latin typeface="+mj-lt"/>
+                <a:ea typeface="+mj-ea"/>
+                <a:cs typeface="+mj-cs"/>
+              </a:defRPr>
+            </a:lvl1pPr>
+          </a:lstStyle>
+          <a:p>
+            <a:r>
+              <a:rPr lang="fr-FR" dirty="0"/>
+              <a:t>Alpha = 1,8</a:t>
+            </a:r>
+          </a:p>
+        </p:txBody>
+      </p:sp>
+      <p:pic>
+        <p:nvPicPr>
+          <p:cNvPr id="6" name="Image 5">
+            <a:extLst>
+              <a:ext uri="{FF2B5EF4-FFF2-40B4-BE49-F238E27FC236}">
+                <a16:creationId xmlns:a16="http://schemas.microsoft.com/office/drawing/2014/main" id="{C8EAE8BE-5C1B-1970-6105-5CC64130BCDC}"/>
+              </a:ext>
+            </a:extLst>
+          </p:cNvPr>
+          <p:cNvPicPr>
+            <a:picLocks noChangeAspect="1"/>
+          </p:cNvPicPr>
+          <p:nvPr/>
+        </p:nvPicPr>
+        <p:blipFill>
+          <a:blip r:embed="rId2"/>
+          <a:stretch>
+            <a:fillRect/>
+          </a:stretch>
+        </p:blipFill>
+        <p:spPr>
+          <a:xfrm>
+            <a:off x="1128936" y="1013545"/>
+            <a:ext cx="9934127" cy="5536638"/>
+          </a:xfrm>
+          <a:prstGeom prst="rect">
+            <a:avLst/>
+          </a:prstGeom>
+        </p:spPr>
+      </p:pic>
+      <p:sp>
+        <p:nvSpPr>
+          <p:cNvPr id="7" name="ZoneTexte 6">
+            <a:extLst>
+              <a:ext uri="{FF2B5EF4-FFF2-40B4-BE49-F238E27FC236}">
+                <a16:creationId xmlns:a16="http://schemas.microsoft.com/office/drawing/2014/main" id="{7A2546CA-0A68-B0DE-295D-7CFC201EAAA6}"/>
+              </a:ext>
+            </a:extLst>
+          </p:cNvPr>
+          <p:cNvSpPr txBox="1"/>
+          <p:nvPr/>
+        </p:nvSpPr>
+        <p:spPr>
+          <a:xfrm>
+            <a:off x="9259409" y="183607"/>
+            <a:ext cx="1269507" cy="646331"/>
+          </a:xfrm>
+          <a:prstGeom prst="rect">
+            <a:avLst/>
+          </a:prstGeom>
+          <a:noFill/>
+        </p:spPr>
+        <p:txBody>
+          <a:bodyPr wrap="square" rtlCol="0">
+            <a:spAutoFit/>
+          </a:bodyPr>
+          <a:lstStyle/>
+          <a:p>
+            <a:r>
+              <a:rPr lang="fr-FR" dirty="0"/>
+              <a:t>Min chi2 =85599.1</a:t>
+            </a:r>
+          </a:p>
+        </p:txBody>
+      </p:sp>
+    </p:spTree>
+    <p:extLst>
+      <p:ext uri="{BB962C8B-B14F-4D97-AF65-F5344CB8AC3E}">
+        <p14:creationId xmlns:p14="http://schemas.microsoft.com/office/powerpoint/2010/main" val="318683417"/>
+      </p:ext>
+    </p:extLst>
+  </p:cSld>
+  <p:clrMapOvr>
+    <a:masterClrMapping/>
+  </p:clrMapOvr>
+</p:sld>
+</file>
+
 <file path=ppt/slides/slide2.xml><?xml version="1.0" encoding="utf-8"?>
 <p:sld xmlns:a="http://schemas.openxmlformats.org/drawingml/2006/main" xmlns:r="http://schemas.openxmlformats.org/officeDocument/2006/relationships" xmlns:p="http://schemas.openxmlformats.org/presentationml/2006/main">
   <p:cSld>
@@ -3964,6 +4451,670 @@
     <p:extLst>
       <p:ext uri="{BB962C8B-B14F-4D97-AF65-F5344CB8AC3E}">
         <p14:creationId xmlns:p14="http://schemas.microsoft.com/office/powerpoint/2010/main" val="4094368408"/>
+      </p:ext>
+    </p:extLst>
+  </p:cSld>
+  <p:clrMapOvr>
+    <a:masterClrMapping/>
+  </p:clrMapOvr>
+</p:sld>
+</file>
+
+<file path=ppt/slides/slide20.xml><?xml version="1.0" encoding="utf-8"?>
+<p:sld xmlns:a="http://schemas.openxmlformats.org/drawingml/2006/main" xmlns:r="http://schemas.openxmlformats.org/officeDocument/2006/relationships" xmlns:p="http://schemas.openxmlformats.org/presentationml/2006/main">
+  <p:cSld>
+    <p:spTree>
+      <p:nvGrpSpPr>
+        <p:cNvPr id="1" name=""/>
+        <p:cNvGrpSpPr/>
+        <p:nvPr/>
+      </p:nvGrpSpPr>
+      <p:grpSpPr>
+        <a:xfrm>
+          <a:off x="0" y="0"/>
+          <a:ext cx="0" cy="0"/>
+          <a:chOff x="0" y="0"/>
+          <a:chExt cx="0" cy="0"/>
+        </a:xfrm>
+      </p:grpSpPr>
+      <p:sp>
+        <p:nvSpPr>
+          <p:cNvPr id="2" name="Titre 1">
+            <a:extLst>
+              <a:ext uri="{FF2B5EF4-FFF2-40B4-BE49-F238E27FC236}">
+                <a16:creationId xmlns:a16="http://schemas.microsoft.com/office/drawing/2014/main" id="{D4CB2CA1-5ABB-F371-4EE4-D9FC06DA5F8F}"/>
+              </a:ext>
+            </a:extLst>
+          </p:cNvPr>
+          <p:cNvSpPr>
+            <a:spLocks noGrp="1"/>
+          </p:cNvSpPr>
+          <p:nvPr>
+            <p:ph type="title"/>
+          </p:nvPr>
+        </p:nvSpPr>
+        <p:spPr/>
+        <p:txBody>
+          <a:bodyPr/>
+          <a:lstStyle/>
+          <a:p>
+            <a:endParaRPr lang="fr-FR"/>
+          </a:p>
+        </p:txBody>
+      </p:sp>
+      <p:sp>
+        <p:nvSpPr>
+          <p:cNvPr id="3" name="Espace réservé du contenu 2">
+            <a:extLst>
+              <a:ext uri="{FF2B5EF4-FFF2-40B4-BE49-F238E27FC236}">
+                <a16:creationId xmlns:a16="http://schemas.microsoft.com/office/drawing/2014/main" id="{85A4AFF6-857C-27C4-325B-B6F5BBA5DF73}"/>
+              </a:ext>
+            </a:extLst>
+          </p:cNvPr>
+          <p:cNvSpPr>
+            <a:spLocks noGrp="1"/>
+          </p:cNvSpPr>
+          <p:nvPr>
+            <p:ph idx="1"/>
+          </p:nvPr>
+        </p:nvSpPr>
+        <p:spPr/>
+        <p:txBody>
+          <a:bodyPr/>
+          <a:lstStyle/>
+          <a:p>
+            <a:endParaRPr lang="fr-FR"/>
+          </a:p>
+        </p:txBody>
+      </p:sp>
+      <p:pic>
+        <p:nvPicPr>
+          <p:cNvPr id="5" name="Image 4">
+            <a:extLst>
+              <a:ext uri="{FF2B5EF4-FFF2-40B4-BE49-F238E27FC236}">
+                <a16:creationId xmlns:a16="http://schemas.microsoft.com/office/drawing/2014/main" id="{5AA15DFC-3821-BB06-E849-67D3BDDFF565}"/>
+              </a:ext>
+            </a:extLst>
+          </p:cNvPr>
+          <p:cNvPicPr>
+            <a:picLocks noChangeAspect="1"/>
+          </p:cNvPicPr>
+          <p:nvPr/>
+        </p:nvPicPr>
+        <p:blipFill>
+          <a:blip r:embed="rId2"/>
+          <a:stretch>
+            <a:fillRect/>
+          </a:stretch>
+        </p:blipFill>
+        <p:spPr>
+          <a:xfrm>
+            <a:off x="419100" y="365125"/>
+            <a:ext cx="11353800" cy="6110849"/>
+          </a:xfrm>
+          <a:prstGeom prst="rect">
+            <a:avLst/>
+          </a:prstGeom>
+        </p:spPr>
+      </p:pic>
+    </p:spTree>
+    <p:extLst>
+      <p:ext uri="{BB962C8B-B14F-4D97-AF65-F5344CB8AC3E}">
+        <p14:creationId xmlns:p14="http://schemas.microsoft.com/office/powerpoint/2010/main" val="1545890945"/>
+      </p:ext>
+    </p:extLst>
+  </p:cSld>
+  <p:clrMapOvr>
+    <a:masterClrMapping/>
+  </p:clrMapOvr>
+</p:sld>
+</file>
+
+<file path=ppt/slides/slide21.xml><?xml version="1.0" encoding="utf-8"?>
+<p:sld xmlns:a="http://schemas.openxmlformats.org/drawingml/2006/main" xmlns:r="http://schemas.openxmlformats.org/officeDocument/2006/relationships" xmlns:p="http://schemas.openxmlformats.org/presentationml/2006/main">
+  <p:cSld>
+    <p:spTree>
+      <p:nvGrpSpPr>
+        <p:cNvPr id="1" name=""/>
+        <p:cNvGrpSpPr/>
+        <p:nvPr/>
+      </p:nvGrpSpPr>
+      <p:grpSpPr>
+        <a:xfrm>
+          <a:off x="0" y="0"/>
+          <a:ext cx="0" cy="0"/>
+          <a:chOff x="0" y="0"/>
+          <a:chExt cx="0" cy="0"/>
+        </a:xfrm>
+      </p:grpSpPr>
+      <p:sp>
+        <p:nvSpPr>
+          <p:cNvPr id="2" name="Titre 1">
+            <a:extLst>
+              <a:ext uri="{FF2B5EF4-FFF2-40B4-BE49-F238E27FC236}">
+                <a16:creationId xmlns:a16="http://schemas.microsoft.com/office/drawing/2014/main" id="{DF382212-F05F-E8AC-1C5A-C84852353103}"/>
+              </a:ext>
+            </a:extLst>
+          </p:cNvPr>
+          <p:cNvSpPr>
+            <a:spLocks noGrp="1"/>
+          </p:cNvSpPr>
+          <p:nvPr>
+            <p:ph type="title"/>
+          </p:nvPr>
+        </p:nvSpPr>
+        <p:spPr/>
+        <p:txBody>
+          <a:bodyPr/>
+          <a:lstStyle/>
+          <a:p>
+            <a:r>
+              <a:rPr lang="fr-FR" dirty="0"/>
+              <a:t>Alpha = 18</a:t>
+            </a:r>
+          </a:p>
+        </p:txBody>
+      </p:sp>
+      <p:pic>
+        <p:nvPicPr>
+          <p:cNvPr id="5" name="Image 4">
+            <a:extLst>
+              <a:ext uri="{FF2B5EF4-FFF2-40B4-BE49-F238E27FC236}">
+                <a16:creationId xmlns:a16="http://schemas.microsoft.com/office/drawing/2014/main" id="{AC274AD6-2358-96B4-D2FD-BB42537F9A66}"/>
+              </a:ext>
+            </a:extLst>
+          </p:cNvPr>
+          <p:cNvPicPr>
+            <a:picLocks noChangeAspect="1"/>
+          </p:cNvPicPr>
+          <p:nvPr/>
+        </p:nvPicPr>
+        <p:blipFill>
+          <a:blip r:embed="rId2"/>
+          <a:stretch>
+            <a:fillRect/>
+          </a:stretch>
+        </p:blipFill>
+        <p:spPr>
+          <a:xfrm>
+            <a:off x="1208842" y="1369933"/>
+            <a:ext cx="9774315" cy="5235613"/>
+          </a:xfrm>
+          <a:prstGeom prst="rect">
+            <a:avLst/>
+          </a:prstGeom>
+        </p:spPr>
+      </p:pic>
+      <p:sp>
+        <p:nvSpPr>
+          <p:cNvPr id="6" name="ZoneTexte 5">
+            <a:extLst>
+              <a:ext uri="{FF2B5EF4-FFF2-40B4-BE49-F238E27FC236}">
+                <a16:creationId xmlns:a16="http://schemas.microsoft.com/office/drawing/2014/main" id="{1C97821C-C27B-0CBB-3C4A-5838095F35E4}"/>
+              </a:ext>
+            </a:extLst>
+          </p:cNvPr>
+          <p:cNvSpPr txBox="1"/>
+          <p:nvPr/>
+        </p:nvSpPr>
+        <p:spPr>
+          <a:xfrm>
+            <a:off x="8833282" y="365125"/>
+            <a:ext cx="1269507" cy="646331"/>
+          </a:xfrm>
+          <a:prstGeom prst="rect">
+            <a:avLst/>
+          </a:prstGeom>
+          <a:noFill/>
+        </p:spPr>
+        <p:txBody>
+          <a:bodyPr wrap="square" rtlCol="0">
+            <a:spAutoFit/>
+          </a:bodyPr>
+          <a:lstStyle/>
+          <a:p>
+            <a:r>
+              <a:rPr lang="fr-FR" dirty="0"/>
+              <a:t>Min chi2 = 718846</a:t>
+            </a:r>
+          </a:p>
+        </p:txBody>
+      </p:sp>
+    </p:spTree>
+    <p:extLst>
+      <p:ext uri="{BB962C8B-B14F-4D97-AF65-F5344CB8AC3E}">
+        <p14:creationId xmlns:p14="http://schemas.microsoft.com/office/powerpoint/2010/main" val="1224286940"/>
+      </p:ext>
+    </p:extLst>
+  </p:cSld>
+  <p:clrMapOvr>
+    <a:masterClrMapping/>
+  </p:clrMapOvr>
+</p:sld>
+</file>
+
+<file path=ppt/slides/slide22.xml><?xml version="1.0" encoding="utf-8"?>
+<p:sld xmlns:a="http://schemas.openxmlformats.org/drawingml/2006/main" xmlns:r="http://schemas.openxmlformats.org/officeDocument/2006/relationships" xmlns:p="http://schemas.openxmlformats.org/presentationml/2006/main">
+  <p:cSld>
+    <p:spTree>
+      <p:nvGrpSpPr>
+        <p:cNvPr id="1" name=""/>
+        <p:cNvGrpSpPr/>
+        <p:nvPr/>
+      </p:nvGrpSpPr>
+      <p:grpSpPr>
+        <a:xfrm>
+          <a:off x="0" y="0"/>
+          <a:ext cx="0" cy="0"/>
+          <a:chOff x="0" y="0"/>
+          <a:chExt cx="0" cy="0"/>
+        </a:xfrm>
+      </p:grpSpPr>
+      <p:sp>
+        <p:nvSpPr>
+          <p:cNvPr id="2" name="Titre 1">
+            <a:extLst>
+              <a:ext uri="{FF2B5EF4-FFF2-40B4-BE49-F238E27FC236}">
+                <a16:creationId xmlns:a16="http://schemas.microsoft.com/office/drawing/2014/main" id="{EF86D883-9940-A0DD-33F4-731A13C5D25D}"/>
+              </a:ext>
+            </a:extLst>
+          </p:cNvPr>
+          <p:cNvSpPr>
+            <a:spLocks noGrp="1"/>
+          </p:cNvSpPr>
+          <p:nvPr>
+            <p:ph type="title"/>
+          </p:nvPr>
+        </p:nvSpPr>
+        <p:spPr/>
+        <p:txBody>
+          <a:bodyPr/>
+          <a:lstStyle/>
+          <a:p>
+            <a:endParaRPr lang="fr-FR"/>
+          </a:p>
+        </p:txBody>
+      </p:sp>
+      <p:sp>
+        <p:nvSpPr>
+          <p:cNvPr id="3" name="Espace réservé du contenu 2">
+            <a:extLst>
+              <a:ext uri="{FF2B5EF4-FFF2-40B4-BE49-F238E27FC236}">
+                <a16:creationId xmlns:a16="http://schemas.microsoft.com/office/drawing/2014/main" id="{EC3AFAC6-A9E9-569D-0B18-271FCA5A4104}"/>
+              </a:ext>
+            </a:extLst>
+          </p:cNvPr>
+          <p:cNvSpPr>
+            <a:spLocks noGrp="1"/>
+          </p:cNvSpPr>
+          <p:nvPr>
+            <p:ph idx="1"/>
+          </p:nvPr>
+        </p:nvSpPr>
+        <p:spPr/>
+        <p:txBody>
+          <a:bodyPr/>
+          <a:lstStyle/>
+          <a:p>
+            <a:endParaRPr lang="fr-FR"/>
+          </a:p>
+        </p:txBody>
+      </p:sp>
+      <p:pic>
+        <p:nvPicPr>
+          <p:cNvPr id="5" name="Image 4">
+            <a:extLst>
+              <a:ext uri="{FF2B5EF4-FFF2-40B4-BE49-F238E27FC236}">
+                <a16:creationId xmlns:a16="http://schemas.microsoft.com/office/drawing/2014/main" id="{F00EB970-3454-7366-AE93-C8699793DB99}"/>
+              </a:ext>
+            </a:extLst>
+          </p:cNvPr>
+          <p:cNvPicPr>
+            <a:picLocks noChangeAspect="1"/>
+          </p:cNvPicPr>
+          <p:nvPr/>
+        </p:nvPicPr>
+        <p:blipFill>
+          <a:blip r:embed="rId2"/>
+          <a:stretch>
+            <a:fillRect/>
+          </a:stretch>
+        </p:blipFill>
+        <p:spPr>
+          <a:xfrm>
+            <a:off x="1120301" y="578189"/>
+            <a:ext cx="9951398" cy="5410649"/>
+          </a:xfrm>
+          <a:prstGeom prst="rect">
+            <a:avLst/>
+          </a:prstGeom>
+        </p:spPr>
+      </p:pic>
+    </p:spTree>
+    <p:extLst>
+      <p:ext uri="{BB962C8B-B14F-4D97-AF65-F5344CB8AC3E}">
+        <p14:creationId xmlns:p14="http://schemas.microsoft.com/office/powerpoint/2010/main" val="1727245590"/>
+      </p:ext>
+    </p:extLst>
+  </p:cSld>
+  <p:clrMapOvr>
+    <a:masterClrMapping/>
+  </p:clrMapOvr>
+</p:sld>
+</file>
+
+<file path=ppt/slides/slide23.xml><?xml version="1.0" encoding="utf-8"?>
+<p:sld xmlns:a="http://schemas.openxmlformats.org/drawingml/2006/main" xmlns:r="http://schemas.openxmlformats.org/officeDocument/2006/relationships" xmlns:p="http://schemas.openxmlformats.org/presentationml/2006/main">
+  <p:cSld>
+    <p:spTree>
+      <p:nvGrpSpPr>
+        <p:cNvPr id="1" name=""/>
+        <p:cNvGrpSpPr/>
+        <p:nvPr/>
+      </p:nvGrpSpPr>
+      <p:grpSpPr>
+        <a:xfrm>
+          <a:off x="0" y="0"/>
+          <a:ext cx="0" cy="0"/>
+          <a:chOff x="0" y="0"/>
+          <a:chExt cx="0" cy="0"/>
+        </a:xfrm>
+      </p:grpSpPr>
+      <p:sp>
+        <p:nvSpPr>
+          <p:cNvPr id="2" name="Titre 1">
+            <a:extLst>
+              <a:ext uri="{FF2B5EF4-FFF2-40B4-BE49-F238E27FC236}">
+                <a16:creationId xmlns:a16="http://schemas.microsoft.com/office/drawing/2014/main" id="{4ED98C3D-A8CB-5322-2BA6-28652FE7824B}"/>
+              </a:ext>
+            </a:extLst>
+          </p:cNvPr>
+          <p:cNvSpPr>
+            <a:spLocks noGrp="1"/>
+          </p:cNvSpPr>
+          <p:nvPr>
+            <p:ph type="title"/>
+          </p:nvPr>
+        </p:nvSpPr>
+        <p:spPr/>
+        <p:txBody>
+          <a:bodyPr/>
+          <a:lstStyle/>
+          <a:p>
+            <a:r>
+              <a:rPr lang="fr-FR" dirty="0"/>
+              <a:t>Alpha = 0,018 </a:t>
+            </a:r>
+          </a:p>
+        </p:txBody>
+      </p:sp>
+      <p:pic>
+        <p:nvPicPr>
+          <p:cNvPr id="5" name="Espace réservé du contenu 4">
+            <a:extLst>
+              <a:ext uri="{FF2B5EF4-FFF2-40B4-BE49-F238E27FC236}">
+                <a16:creationId xmlns:a16="http://schemas.microsoft.com/office/drawing/2014/main" id="{7A94EE3B-FBD0-A94A-9873-EEFCF91BFF24}"/>
+              </a:ext>
+            </a:extLst>
+          </p:cNvPr>
+          <p:cNvPicPr>
+            <a:picLocks noGrp="1" noChangeAspect="1"/>
+          </p:cNvPicPr>
+          <p:nvPr>
+            <p:ph idx="1"/>
+          </p:nvPr>
+        </p:nvPicPr>
+        <p:blipFill>
+          <a:blip r:embed="rId2"/>
+          <a:stretch>
+            <a:fillRect/>
+          </a:stretch>
+        </p:blipFill>
+        <p:spPr>
+          <a:xfrm>
+            <a:off x="2637261" y="1459527"/>
+            <a:ext cx="6275920" cy="4752947"/>
+          </a:xfrm>
+        </p:spPr>
+      </p:pic>
+      <p:sp>
+        <p:nvSpPr>
+          <p:cNvPr id="6" name="ZoneTexte 5">
+            <a:extLst>
+              <a:ext uri="{FF2B5EF4-FFF2-40B4-BE49-F238E27FC236}">
+                <a16:creationId xmlns:a16="http://schemas.microsoft.com/office/drawing/2014/main" id="{93AD0C8E-3D86-16A8-F6B7-8599F97EEFF6}"/>
+              </a:ext>
+            </a:extLst>
+          </p:cNvPr>
+          <p:cNvSpPr txBox="1"/>
+          <p:nvPr/>
+        </p:nvSpPr>
+        <p:spPr>
+          <a:xfrm>
+            <a:off x="9223899" y="704740"/>
+            <a:ext cx="1269507" cy="646331"/>
+          </a:xfrm>
+          <a:prstGeom prst="rect">
+            <a:avLst/>
+          </a:prstGeom>
+          <a:noFill/>
+        </p:spPr>
+        <p:txBody>
+          <a:bodyPr wrap="square" rtlCol="0">
+            <a:spAutoFit/>
+          </a:bodyPr>
+          <a:lstStyle/>
+          <a:p>
+            <a:r>
+              <a:rPr lang="fr-FR" dirty="0"/>
+              <a:t>Min chi2 =1576.237</a:t>
+            </a:r>
+          </a:p>
+        </p:txBody>
+      </p:sp>
+    </p:spTree>
+    <p:extLst>
+      <p:ext uri="{BB962C8B-B14F-4D97-AF65-F5344CB8AC3E}">
+        <p14:creationId xmlns:p14="http://schemas.microsoft.com/office/powerpoint/2010/main" val="660529606"/>
+      </p:ext>
+    </p:extLst>
+  </p:cSld>
+  <p:clrMapOvr>
+    <a:masterClrMapping/>
+  </p:clrMapOvr>
+</p:sld>
+</file>
+
+<file path=ppt/slides/slide24.xml><?xml version="1.0" encoding="utf-8"?>
+<p:sld xmlns:a="http://schemas.openxmlformats.org/drawingml/2006/main" xmlns:r="http://schemas.openxmlformats.org/officeDocument/2006/relationships" xmlns:p="http://schemas.openxmlformats.org/presentationml/2006/main">
+  <p:cSld>
+    <p:spTree>
+      <p:nvGrpSpPr>
+        <p:cNvPr id="1" name=""/>
+        <p:cNvGrpSpPr/>
+        <p:nvPr/>
+      </p:nvGrpSpPr>
+      <p:grpSpPr>
+        <a:xfrm>
+          <a:off x="0" y="0"/>
+          <a:ext cx="0" cy="0"/>
+          <a:chOff x="0" y="0"/>
+          <a:chExt cx="0" cy="0"/>
+        </a:xfrm>
+      </p:grpSpPr>
+      <p:sp>
+        <p:nvSpPr>
+          <p:cNvPr id="2" name="Titre 1">
+            <a:extLst>
+              <a:ext uri="{FF2B5EF4-FFF2-40B4-BE49-F238E27FC236}">
+                <a16:creationId xmlns:a16="http://schemas.microsoft.com/office/drawing/2014/main" id="{2EF0EB06-45CE-DE6A-DCD1-4D4ED18619AE}"/>
+              </a:ext>
+            </a:extLst>
+          </p:cNvPr>
+          <p:cNvSpPr>
+            <a:spLocks noGrp="1"/>
+          </p:cNvSpPr>
+          <p:nvPr>
+            <p:ph type="title"/>
+          </p:nvPr>
+        </p:nvSpPr>
+        <p:spPr/>
+        <p:txBody>
+          <a:bodyPr/>
+          <a:lstStyle/>
+          <a:p>
+            <a:endParaRPr lang="fr-FR"/>
+          </a:p>
+        </p:txBody>
+      </p:sp>
+      <p:sp>
+        <p:nvSpPr>
+          <p:cNvPr id="3" name="Espace réservé du contenu 2">
+            <a:extLst>
+              <a:ext uri="{FF2B5EF4-FFF2-40B4-BE49-F238E27FC236}">
+                <a16:creationId xmlns:a16="http://schemas.microsoft.com/office/drawing/2014/main" id="{B3066349-0810-B4D7-5EDD-478C2DC38E66}"/>
+              </a:ext>
+            </a:extLst>
+          </p:cNvPr>
+          <p:cNvSpPr>
+            <a:spLocks noGrp="1"/>
+          </p:cNvSpPr>
+          <p:nvPr>
+            <p:ph idx="1"/>
+          </p:nvPr>
+        </p:nvSpPr>
+        <p:spPr/>
+        <p:txBody>
+          <a:bodyPr/>
+          <a:lstStyle/>
+          <a:p>
+            <a:endParaRPr lang="fr-FR"/>
+          </a:p>
+        </p:txBody>
+      </p:sp>
+      <p:pic>
+        <p:nvPicPr>
+          <p:cNvPr id="5" name="Image 4">
+            <a:extLst>
+              <a:ext uri="{FF2B5EF4-FFF2-40B4-BE49-F238E27FC236}">
+                <a16:creationId xmlns:a16="http://schemas.microsoft.com/office/drawing/2014/main" id="{D12199D6-5DCE-C356-70DF-ED058E128669}"/>
+              </a:ext>
+            </a:extLst>
+          </p:cNvPr>
+          <p:cNvPicPr>
+            <a:picLocks noChangeAspect="1"/>
+          </p:cNvPicPr>
+          <p:nvPr/>
+        </p:nvPicPr>
+        <p:blipFill>
+          <a:blip r:embed="rId2"/>
+          <a:stretch>
+            <a:fillRect/>
+          </a:stretch>
+        </p:blipFill>
+        <p:spPr>
+          <a:xfrm>
+            <a:off x="2214199" y="365125"/>
+            <a:ext cx="7959700" cy="6013509"/>
+          </a:xfrm>
+          <a:prstGeom prst="rect">
+            <a:avLst/>
+          </a:prstGeom>
+        </p:spPr>
+      </p:pic>
+    </p:spTree>
+    <p:extLst>
+      <p:ext uri="{BB962C8B-B14F-4D97-AF65-F5344CB8AC3E}">
+        <p14:creationId xmlns:p14="http://schemas.microsoft.com/office/powerpoint/2010/main" val="1023390586"/>
+      </p:ext>
+    </p:extLst>
+  </p:cSld>
+  <p:clrMapOvr>
+    <a:masterClrMapping/>
+  </p:clrMapOvr>
+</p:sld>
+</file>
+
+<file path=ppt/slides/slide25.xml><?xml version="1.0" encoding="utf-8"?>
+<p:sld xmlns:a="http://schemas.openxmlformats.org/drawingml/2006/main" xmlns:r="http://schemas.openxmlformats.org/officeDocument/2006/relationships" xmlns:p="http://schemas.openxmlformats.org/presentationml/2006/main">
+  <p:cSld>
+    <p:spTree>
+      <p:nvGrpSpPr>
+        <p:cNvPr id="1" name=""/>
+        <p:cNvGrpSpPr/>
+        <p:nvPr/>
+      </p:nvGrpSpPr>
+      <p:grpSpPr>
+        <a:xfrm>
+          <a:off x="0" y="0"/>
+          <a:ext cx="0" cy="0"/>
+          <a:chOff x="0" y="0"/>
+          <a:chExt cx="0" cy="0"/>
+        </a:xfrm>
+      </p:grpSpPr>
+      <p:sp>
+        <p:nvSpPr>
+          <p:cNvPr id="2" name="Titre 1">
+            <a:extLst>
+              <a:ext uri="{FF2B5EF4-FFF2-40B4-BE49-F238E27FC236}">
+                <a16:creationId xmlns:a16="http://schemas.microsoft.com/office/drawing/2014/main" id="{DDD3C4AF-EC7D-423E-3D20-8B5C7F62934F}"/>
+              </a:ext>
+            </a:extLst>
+          </p:cNvPr>
+          <p:cNvSpPr>
+            <a:spLocks noGrp="1"/>
+          </p:cNvSpPr>
+          <p:nvPr>
+            <p:ph type="title"/>
+          </p:nvPr>
+        </p:nvSpPr>
+        <p:spPr/>
+        <p:txBody>
+          <a:bodyPr/>
+          <a:lstStyle/>
+          <a:p>
+            <a:r>
+              <a:rPr lang="fr-FR" dirty="0"/>
+              <a:t>Alpha = 0 (LCDM classique)</a:t>
+            </a:r>
+          </a:p>
+        </p:txBody>
+      </p:sp>
+      <p:sp>
+        <p:nvSpPr>
+          <p:cNvPr id="3" name="Espace réservé du contenu 2">
+            <a:extLst>
+              <a:ext uri="{FF2B5EF4-FFF2-40B4-BE49-F238E27FC236}">
+                <a16:creationId xmlns:a16="http://schemas.microsoft.com/office/drawing/2014/main" id="{29A0CAE8-1593-0105-07A7-FE128EEAEE24}"/>
+              </a:ext>
+            </a:extLst>
+          </p:cNvPr>
+          <p:cNvSpPr>
+            <a:spLocks noGrp="1"/>
+          </p:cNvSpPr>
+          <p:nvPr>
+            <p:ph idx="1"/>
+          </p:nvPr>
+        </p:nvSpPr>
+        <p:spPr/>
+        <p:txBody>
+          <a:bodyPr/>
+          <a:lstStyle/>
+          <a:p>
+            <a:pPr marL="0" indent="0">
+              <a:buNone/>
+            </a:pPr>
+            <a:r>
+              <a:rPr lang="fr-FR" dirty="0"/>
+              <a:t>Min chi2 = 1529.046</a:t>
+            </a:r>
+          </a:p>
+        </p:txBody>
+      </p:sp>
+    </p:spTree>
+    <p:extLst>
+      <p:ext uri="{BB962C8B-B14F-4D97-AF65-F5344CB8AC3E}">
+        <p14:creationId xmlns:p14="http://schemas.microsoft.com/office/powerpoint/2010/main" val="1721570499"/>
       </p:ext>
     </p:extLst>
   </p:cSld>
@@ -4322,7 +5473,7 @@
           <a:bodyPr/>
           <a:lstStyle/>
           <a:p>
-            <a:endParaRPr lang="fr-FR"/>
+            <a:endParaRPr lang="fr-FR" dirty="0"/>
           </a:p>
         </p:txBody>
       </p:sp>

</xml_diff>